<commit_message>
Added endpoint to fetch all of the files of the user
</commit_message>
<xml_diff>
--- a/הצגת ספרינט 2 - פרויקט Bobox.pptx
+++ b/הצגת ספרינט 2 - פרויקט Bobox.pptx
@@ -1797,19 +1797,292 @@
           </a:bodyPr>
           <a:lstStyle/>
           <a:p>
-            <a:pPr marL="0" lvl="0" indent="0" algn="l" rtl="0">
-              <a:spcBef>
-                <a:spcPts val="0"/>
-              </a:spcBef>
-              <a:spcAft>
-                <a:spcPts val="0"/>
-              </a:spcAft>
+            <a:pPr marL="228600" lvl="0" indent="-50800">
+              <a:lnSpc>
+                <a:spcPct val="90000"/>
+              </a:lnSpc>
+              <a:spcBef>
+                <a:spcPts val="0"/>
+              </a:spcBef>
+              <a:spcAft>
+                <a:spcPts val="0"/>
+              </a:spcAft>
+              <a:buClr>
+                <a:srgbClr val="002060"/>
+              </a:buClr>
+              <a:buSzPct val="82352"/>
               <a:buNone/>
             </a:pPr>
             <a:r>
               <a:rPr lang="iw-IL" dirty="0"/>
               <a:t>חלוקת משימות, מה הספקתם...</a:t>
             </a:r>
+            <a:r>
+              <a:rPr lang="iw-IL" sz="1400" b="1" dirty="0"/>
+              <a:t> העבודה התחלקה כך: </a:t>
+            </a:r>
+          </a:p>
+          <a:p>
+            <a:pPr marL="228600" lvl="0" indent="-50800">
+              <a:spcBef>
+                <a:spcPts val="0"/>
+              </a:spcBef>
+              <a:spcAft>
+                <a:spcPts val="0"/>
+              </a:spcAft>
+              <a:buClr>
+                <a:schemeClr val="dk1"/>
+              </a:buClr>
+              <a:buSzPct val="37555"/>
+              <a:buNone/>
+            </a:pPr>
+            <a:br>
+              <a:rPr lang="iw-IL" dirty="0"/>
+            </a:br>
+            <a:r>
+              <a:rPr lang="iw-IL" sz="1200" dirty="0"/>
+              <a:t>אופק היה אחראי על כל מה שקשור ל</a:t>
+            </a:r>
+            <a:r>
+              <a:rPr lang="iw-IL" sz="1200" b="1" dirty="0"/>
+              <a:t>שיתוף הקבצים</a:t>
+            </a:r>
+            <a:r>
+              <a:rPr lang="iw-IL" sz="1200" dirty="0"/>
+              <a:t>, מפיתוח ה</a:t>
+            </a:r>
+            <a:r>
+              <a:rPr lang="en-US" sz="1200" dirty="0"/>
+              <a:t>Endpoints  </a:t>
+            </a:r>
+            <a:r>
+              <a:rPr lang="iw-IL" sz="1200" dirty="0"/>
+              <a:t>הרלוונטים בשרת ועד התממשקות עם ה</a:t>
+            </a:r>
+            <a:r>
+              <a:rPr lang="en-US" sz="1200" dirty="0"/>
+              <a:t>API </a:t>
+            </a:r>
+            <a:r>
+              <a:rPr lang="iw-IL" sz="1200" dirty="0"/>
+              <a:t>עם הלקוח.</a:t>
+            </a:r>
+          </a:p>
+          <a:p>
+            <a:pPr marL="228600" lvl="0" indent="-50800">
+              <a:spcBef>
+                <a:spcPts val="0"/>
+              </a:spcBef>
+              <a:spcAft>
+                <a:spcPts val="0"/>
+              </a:spcAft>
+              <a:buClr>
+                <a:schemeClr val="dk1"/>
+              </a:buClr>
+              <a:buSzPct val="37555"/>
+              <a:buNone/>
+            </a:pPr>
+            <a:endParaRPr lang="iw-IL" sz="1200" dirty="0"/>
+          </a:p>
+          <a:p>
+            <a:pPr marL="228600" lvl="0" indent="-50800">
+              <a:spcBef>
+                <a:spcPts val="0"/>
+              </a:spcBef>
+              <a:spcAft>
+                <a:spcPts val="0"/>
+              </a:spcAft>
+              <a:buClr>
+                <a:schemeClr val="dk1"/>
+              </a:buClr>
+              <a:buSzPct val="37555"/>
+              <a:buNone/>
+            </a:pPr>
+            <a:r>
+              <a:rPr lang="iw-IL" sz="1200" dirty="0"/>
+              <a:t>דניאל היה אחראי על כל מה שקשור ל</a:t>
+            </a:r>
+            <a:r>
+              <a:rPr lang="iw-IL" sz="1200" b="1" dirty="0"/>
+              <a:t>הורדת הקבצים</a:t>
+            </a:r>
+            <a:r>
+              <a:rPr lang="iw-IL" sz="1200" dirty="0"/>
+              <a:t>, מפיתוח ה</a:t>
+            </a:r>
+            <a:r>
+              <a:rPr lang="en-US" sz="1200" dirty="0"/>
+              <a:t>Endpoints  </a:t>
+            </a:r>
+            <a:r>
+              <a:rPr lang="iw-IL" sz="1200" dirty="0"/>
+              <a:t>הרלוונטים בשרת ועד התממשקות עם ה</a:t>
+            </a:r>
+            <a:r>
+              <a:rPr lang="en-US" sz="1200" dirty="0"/>
+              <a:t>API </a:t>
+            </a:r>
+            <a:r>
+              <a:rPr lang="iw-IL" sz="1200" dirty="0"/>
+              <a:t>עם הלקוח.</a:t>
+            </a:r>
+          </a:p>
+          <a:p>
+            <a:pPr marL="228600" lvl="0" indent="-50800">
+              <a:spcBef>
+                <a:spcPts val="0"/>
+              </a:spcBef>
+              <a:spcAft>
+                <a:spcPts val="0"/>
+              </a:spcAft>
+              <a:buClr>
+                <a:schemeClr val="dk1"/>
+              </a:buClr>
+              <a:buSzPct val="37555"/>
+              <a:buNone/>
+            </a:pPr>
+            <a:endParaRPr lang="iw-IL" sz="1200" dirty="0"/>
+          </a:p>
+          <a:p>
+            <a:pPr marL="228600" lvl="0" indent="-50800">
+              <a:spcBef>
+                <a:spcPts val="0"/>
+              </a:spcBef>
+              <a:spcAft>
+                <a:spcPts val="0"/>
+              </a:spcAft>
+              <a:buClr>
+                <a:schemeClr val="dk1"/>
+              </a:buClr>
+              <a:buSzPct val="37555"/>
+              <a:buNone/>
+            </a:pPr>
+            <a:r>
+              <a:rPr lang="iw-IL" sz="1200" dirty="0"/>
+              <a:t>החלטנו ביחד על הדרך שבה אנחנו מאפשרים גישה לקובץ, מאחר וזה קשור לארכיטקטורה של הפרויקט.</a:t>
+            </a:r>
+            <a:br>
+              <a:rPr lang="iw-IL" sz="1200" dirty="0"/>
+            </a:br>
+            <a:br>
+              <a:rPr lang="iw-IL" sz="1200" dirty="0"/>
+            </a:br>
+            <a:r>
+              <a:rPr lang="iw-IL" sz="1200" dirty="0"/>
+              <a:t>הספקנו את כל המטרות שלנו.</a:t>
+            </a:r>
+          </a:p>
+          <a:p>
+            <a:pPr marL="228600" lvl="0" indent="-50800">
+              <a:spcBef>
+                <a:spcPts val="0"/>
+              </a:spcBef>
+              <a:spcAft>
+                <a:spcPts val="0"/>
+              </a:spcAft>
+              <a:buClr>
+                <a:schemeClr val="dk1"/>
+              </a:buClr>
+              <a:buSzPct val="37555"/>
+              <a:buNone/>
+            </a:pPr>
+            <a:endParaRPr lang="iw-IL" sz="1200" dirty="0"/>
+          </a:p>
+          <a:p>
+            <a:pPr marL="228600" lvl="0" indent="-50800">
+              <a:spcBef>
+                <a:spcPts val="0"/>
+              </a:spcBef>
+              <a:spcAft>
+                <a:spcPts val="0"/>
+              </a:spcAft>
+              <a:buClr>
+                <a:schemeClr val="dk1"/>
+              </a:buClr>
+              <a:buSzPct val="39285"/>
+              <a:buNone/>
+            </a:pPr>
+            <a:endParaRPr lang="iw-IL" dirty="0"/>
+          </a:p>
+          <a:p>
+            <a:pPr marL="228600" lvl="0" indent="-50800">
+              <a:spcBef>
+                <a:spcPts val="0"/>
+              </a:spcBef>
+              <a:spcAft>
+                <a:spcPts val="0"/>
+              </a:spcAft>
+              <a:buClr>
+                <a:schemeClr val="dk1"/>
+              </a:buClr>
+              <a:buSzPct val="39285"/>
+              <a:buNone/>
+            </a:pPr>
+            <a:endParaRPr lang="iw-IL" dirty="0"/>
+          </a:p>
+          <a:p>
+            <a:pPr marL="228600" lvl="0" indent="-50800">
+              <a:spcBef>
+                <a:spcPts val="0"/>
+              </a:spcBef>
+              <a:spcAft>
+                <a:spcPts val="0"/>
+              </a:spcAft>
+              <a:buClr>
+                <a:schemeClr val="dk1"/>
+              </a:buClr>
+              <a:buSzPct val="39285"/>
+              <a:buFont typeface="Arial"/>
+              <a:buNone/>
+            </a:pPr>
+            <a:endParaRPr lang="iw-IL" dirty="0"/>
+          </a:p>
+          <a:p>
+            <a:pPr marL="228600" lvl="0" indent="-50800">
+              <a:spcBef>
+                <a:spcPts val="0"/>
+              </a:spcBef>
+              <a:spcAft>
+                <a:spcPts val="0"/>
+              </a:spcAft>
+              <a:buClr>
+                <a:schemeClr val="dk1"/>
+              </a:buClr>
+              <a:buSzPct val="39285"/>
+              <a:buFont typeface="Arial"/>
+              <a:buNone/>
+            </a:pPr>
+            <a:endParaRPr lang="iw-IL" dirty="0"/>
+          </a:p>
+          <a:p>
+            <a:pPr marL="228600" lvl="0" indent="-50800">
+              <a:lnSpc>
+                <a:spcPct val="90000"/>
+              </a:lnSpc>
+              <a:spcBef>
+                <a:spcPts val="0"/>
+              </a:spcBef>
+              <a:spcAft>
+                <a:spcPts val="0"/>
+              </a:spcAft>
+              <a:buClr>
+                <a:srgbClr val="002060"/>
+              </a:buClr>
+              <a:buSzPct val="100000"/>
+              <a:buNone/>
+            </a:pPr>
+            <a:endParaRPr lang="iw-IL" dirty="0"/>
+          </a:p>
+          <a:p>
+            <a:pPr marL="0" lvl="0" indent="0" algn="l" rtl="0">
+              <a:spcBef>
+                <a:spcPts val="0"/>
+              </a:spcBef>
+              <a:spcAft>
+                <a:spcPts val="0"/>
+              </a:spcAft>
+              <a:buNone/>
+            </a:pPr>
             <a:endParaRPr dirty="0"/>
           </a:p>
         </p:txBody>
@@ -15970,7 +16243,7 @@
         </p:spPr>
         <p:txBody>
           <a:bodyPr spcFirstLastPara="1" wrap="square" lIns="91425" tIns="45700" rIns="91425" bIns="45700" anchor="t" anchorCtr="0">
-            <a:normAutofit fontScale="92500" lnSpcReduction="10000"/>
+            <a:normAutofit/>
           </a:bodyPr>
           <a:lstStyle/>
           <a:p>
@@ -16015,7 +16288,15 @@
             </a:br>
             <a:r>
               <a:rPr lang="iw-IL" sz="2929" dirty="0"/>
-              <a:t>אופק היה אחראי על כל מה שקשור ל</a:t>
+              <a:t>אופק </a:t>
+            </a:r>
+            <a:r>
+              <a:rPr lang="he-IL" sz="2929" dirty="0"/>
+              <a:t>-</a:t>
+            </a:r>
+            <a:r>
+              <a:rPr lang="iw-IL" sz="2929" dirty="0"/>
+              <a:t> </a:t>
             </a:r>
             <a:r>
               <a:rPr lang="iw-IL" sz="2929" b="1" dirty="0"/>
@@ -16023,23 +16304,27 @@
             </a:r>
             <a:r>
               <a:rPr lang="he-IL" sz="2929" dirty="0"/>
-              <a:t>, </a:t>
+              <a:t>:</a:t>
+            </a:r>
+            <a:r>
+              <a:rPr lang="he-IL" sz="2929" b="1" dirty="0"/>
+              <a:t> </a:t>
             </a:r>
             <a:r>
               <a:rPr lang="iw-IL" sz="2929" dirty="0"/>
-              <a:t>מפיתוח ה</a:t>
+              <a:t>פיתוח ה</a:t>
             </a:r>
             <a:r>
               <a:rPr lang="en-US" sz="2929" dirty="0"/>
-              <a:t>Endpoints </a:t>
+              <a:t>Endpoints</a:t>
             </a:r>
             <a:r>
               <a:rPr lang="he-IL" sz="2929" dirty="0"/>
-              <a:t> ה</a:t>
+              <a:t> </a:t>
             </a:r>
             <a:r>
               <a:rPr lang="iw-IL" sz="2929" dirty="0"/>
-              <a:t>רלוונטים בשרת ועד התממשקות עם ה</a:t>
+              <a:t>והתממשקות עם ה</a:t>
             </a:r>
             <a:r>
               <a:rPr lang="en-US" sz="2929" dirty="0"/>
@@ -16047,7 +16332,7 @@
             </a:r>
             <a:r>
               <a:rPr lang="he-IL" sz="2929" dirty="0"/>
-              <a:t> עם הלקוח.</a:t>
+              <a:t> בעזרת הלקוח</a:t>
             </a:r>
           </a:p>
           <a:p>
@@ -16082,27 +16367,31 @@
             </a:pPr>
             <a:r>
               <a:rPr lang="iw-IL" sz="2929" dirty="0"/>
-              <a:t>דניאל היה אחראי על כל מה שקשור ל</a:t>
+              <a:t>דניאל </a:t>
+            </a:r>
+            <a:r>
+              <a:rPr lang="he-IL" sz="2929" dirty="0"/>
+              <a:t> - </a:t>
             </a:r>
             <a:r>
               <a:rPr lang="he-IL" sz="2929" b="1" dirty="0"/>
-              <a:t>הורדת</a:t>
-            </a:r>
-            <a:r>
-              <a:rPr lang="iw-IL" sz="2929" b="1" dirty="0"/>
-              <a:t> הקבצים</a:t>
+              <a:t>הורדת הקבצים</a:t>
             </a:r>
             <a:r>
               <a:rPr lang="he-IL" sz="2929" dirty="0"/>
-              <a:t>, </a:t>
+              <a:t>:</a:t>
+            </a:r>
+            <a:r>
+              <a:rPr lang="he-IL" sz="2929" b="1" dirty="0"/>
+              <a:t> </a:t>
             </a:r>
             <a:r>
               <a:rPr lang="iw-IL" sz="2929" dirty="0"/>
-              <a:t>מפיתוח ה</a:t>
+              <a:t>פיתוח ה</a:t>
             </a:r>
             <a:r>
               <a:rPr lang="en-US" sz="2929" dirty="0"/>
-              <a:t>Endpoints </a:t>
+              <a:t>Endpoints</a:t>
             </a:r>
             <a:r>
               <a:rPr lang="he-IL" sz="2929" dirty="0"/>
@@ -16110,7 +16399,7 @@
             </a:r>
             <a:r>
               <a:rPr lang="iw-IL" sz="2929" dirty="0"/>
-              <a:t>הרלוונטים בשרת ועד התממשקות עם ה</a:t>
+              <a:t>והתממשקות עם ה</a:t>
             </a:r>
             <a:r>
               <a:rPr lang="en-US" sz="2929" dirty="0"/>
@@ -16118,7 +16407,7 @@
             </a:r>
             <a:r>
               <a:rPr lang="he-IL" sz="2929" dirty="0"/>
-              <a:t> עם הלקוח.</a:t>
+              <a:t> בעזרת הלקוח</a:t>
             </a:r>
           </a:p>
           <a:p>
@@ -16153,33 +16442,11 @@
             </a:pPr>
             <a:r>
               <a:rPr lang="he-IL" sz="2929" dirty="0"/>
-              <a:t>החלטנו ביחד על הדרך שבה אנחנו מאפשרים גישה לקובץ, מאחר וזה קשור לארכיטקטורה של הפרויקט.</a:t>
+              <a:t>ביחד – תכנון גישה לקובץ</a:t>
             </a:r>
             <a:br>
               <a:rPr lang="en-US" sz="2929" dirty="0"/>
             </a:br>
-            <a:br>
-              <a:rPr lang="he-IL" sz="2929" dirty="0"/>
-            </a:br>
-            <a:r>
-              <a:rPr lang="he-IL" sz="2929" dirty="0"/>
-              <a:t>הספקנו את כל המטרות שלנו.</a:t>
-            </a:r>
-          </a:p>
-          <a:p>
-            <a:pPr marL="228600" lvl="0" indent="-50800">
-              <a:spcBef>
-                <a:spcPts val="0"/>
-              </a:spcBef>
-              <a:spcAft>
-                <a:spcPts val="0"/>
-              </a:spcAft>
-              <a:buClr>
-                <a:schemeClr val="dk1"/>
-              </a:buClr>
-              <a:buSzPct val="37555"/>
-              <a:buNone/>
-            </a:pPr>
             <a:endParaRPr sz="2929" dirty="0"/>
           </a:p>
           <a:p>
@@ -16555,61 +16822,6 @@
               <a:rPr lang="iw-IL" dirty="0"/>
               <a:t>הייתה עבודת צוות מעולה, כל אחד ביצע את החלק שלו כמו שצריך ולא התבייש להעזר בשני כשצריך.</a:t>
             </a:r>
-            <a:br>
-              <a:rPr lang="iw-IL" dirty="0"/>
-            </a:br>
-            <a:endParaRPr dirty="0"/>
-          </a:p>
-          <a:p>
-            <a:pPr marL="457200" lvl="0" indent="-342900" algn="r" rtl="1">
-              <a:lnSpc>
-                <a:spcPct val="90000"/>
-              </a:lnSpc>
-              <a:spcBef>
-                <a:spcPts val="0"/>
-              </a:spcBef>
-              <a:spcAft>
-                <a:spcPts val="0"/>
-              </a:spcAft>
-              <a:buSzPts val="1800"/>
-              <a:buChar char="o"/>
-            </a:pPr>
-            <a:r>
-              <a:rPr lang="iw-IL" dirty="0"/>
-              <a:t>טכנולוגיה- Cloudflare R2 תומך בAPI שלAmazon S3 </a:t>
-            </a:r>
-            <a:r>
-              <a:rPr lang="he-IL" dirty="0"/>
-              <a:t> </a:t>
-            </a:r>
-            <a:r>
-              <a:rPr lang="iw-IL" dirty="0"/>
-              <a:t>אז השתמשנו בSDK שלAmazon S3 לJavaScript </a:t>
-            </a:r>
-            <a:r>
-              <a:rPr lang="he-IL" dirty="0"/>
-              <a:t> </a:t>
-            </a:r>
-            <a:r>
-              <a:rPr lang="iw-IL" dirty="0"/>
-              <a:t>בצד השרת וזה חסך לנו הרבה זמן וכאב ראש לעומת אם היינו משתמשים בWorkers API </a:t>
-            </a:r>
-            <a:r>
-              <a:rPr lang="he-IL" dirty="0"/>
-              <a:t> </a:t>
-            </a:r>
-            <a:r>
-              <a:rPr lang="iw-IL" dirty="0"/>
-              <a:t>שלהם או אפילו בAPI </a:t>
-            </a:r>
-            <a:r>
-              <a:rPr lang="he-IL" dirty="0"/>
-              <a:t> </a:t>
-            </a:r>
-            <a:r>
-              <a:rPr lang="iw-IL" dirty="0"/>
-              <a:t>של Amazon S3 שהרבה יותר מסובכים ופחות נוחים לשימוש.</a:t>
-            </a:r>
             <a:endParaRPr dirty="0"/>
           </a:p>
         </p:txBody>
@@ -16776,20 +16988,11 @@
             </a:pPr>
             <a:r>
               <a:rPr lang="he-IL" dirty="0"/>
-              <a:t>מחיקת קובץ (פיצ'ר 5.2)</a:t>
+              <a:t>מחיקת קובץ</a:t>
             </a:r>
-          </a:p>
-          <a:p>
-            <a:pPr marL="457200" lvl="0" indent="-342900" algn="r" rtl="1">
-              <a:spcBef>
-                <a:spcPts val="0"/>
-              </a:spcBef>
-              <a:spcAft>
-                <a:spcPts val="0"/>
-              </a:spcAft>
-              <a:buSzPts val="1800"/>
-              <a:buChar char="o"/>
-            </a:pPr>
+            <a:br>
+              <a:rPr lang="en-US" dirty="0"/>
+            </a:br>
             <a:endParaRPr lang="he-IL" dirty="0"/>
           </a:p>
           <a:p>

</xml_diff>